<commit_message>
Update install PPTX, posted on Sessions page
</commit_message>
<xml_diff>
--- a/2020/ECP/slides/02-install.pptx
+++ b/2020/ECP/slides/02-install.pptx
@@ -5,17 +5,15 @@
     <p:sldMasterId id="2147483935" r:id="rId4"/>
   </p:sldMasterIdLst>
   <p:notesMasterIdLst>
-    <p:notesMasterId r:id="rId10"/>
+    <p:notesMasterId r:id="rId8"/>
   </p:notesMasterIdLst>
   <p:handoutMasterIdLst>
-    <p:handoutMasterId r:id="rId11"/>
+    <p:handoutMasterId r:id="rId9"/>
   </p:handoutMasterIdLst>
   <p:sldIdLst>
     <p:sldId id="385" r:id="rId5"/>
-    <p:sldId id="404" r:id="rId6"/>
-    <p:sldId id="405" r:id="rId7"/>
-    <p:sldId id="406" r:id="rId8"/>
-    <p:sldId id="393" r:id="rId9"/>
+    <p:sldId id="405" r:id="rId6"/>
+    <p:sldId id="393" r:id="rId7"/>
   </p:sldIdLst>
   <p:sldSz cx="12188825" cy="6858000"/>
   <p:notesSz cx="7010400" cy="9296400"/>
@@ -265,7 +263,7 @@
           <a:p>
             <a:fld id="{0B842F42-2CE9-4E35-95C1-410DC08A50B1}" type="datetimeFigureOut">
               <a:rPr lang="en-US" smtClean="0"/>
-              <a:t>1/28/2020</a:t>
+              <a:t>2/2/2020</a:t>
             </a:fld>
             <a:endParaRPr lang="en-US"/>
           </a:p>
@@ -430,7 +428,7 @@
           <a:p>
             <a:fld id="{6F282904-F315-4730-8D91-37D99E141A6F}" type="datetimeFigureOut">
               <a:rPr lang="en-US" smtClean="0"/>
-              <a:t>1/28/2020</a:t>
+              <a:t>2/2/2020</a:t>
             </a:fld>
             <a:endParaRPr lang="en-US"/>
           </a:p>
@@ -3395,116 +3393,6 @@
       </p:grpSpPr>
       <p:sp>
         <p:nvSpPr>
-          <p:cNvPr id="2" name="Title 1">
-            <a:extLst>
-              <a:ext uri="{FF2B5EF4-FFF2-40B4-BE49-F238E27FC236}">
-                <a16:creationId xmlns:a16="http://schemas.microsoft.com/office/drawing/2014/main" xmlns="" id="{B0E33EF4-7CD6-D546-972C-5F24984D6602}"/>
-              </a:ext>
-            </a:extLst>
-          </p:cNvPr>
-          <p:cNvSpPr>
-            <a:spLocks noGrp="1"/>
-          </p:cNvSpPr>
-          <p:nvPr>
-            <p:ph type="title"/>
-          </p:nvPr>
-        </p:nvSpPr>
-        <p:spPr/>
-        <p:txBody>
-          <a:bodyPr/>
-          <a:lstStyle/>
-          <a:p>
-            <a:r>
-              <a:rPr lang="en-US" dirty="0"/>
-              <a:t>Talk Outline</a:t>
-            </a:r>
-          </a:p>
-        </p:txBody>
-      </p:sp>
-      <p:sp>
-        <p:nvSpPr>
-          <p:cNvPr id="3" name="Content Placeholder 2">
-            <a:extLst>
-              <a:ext uri="{FF2B5EF4-FFF2-40B4-BE49-F238E27FC236}">
-                <a16:creationId xmlns:a16="http://schemas.microsoft.com/office/drawing/2014/main" xmlns="" id="{79DDA83B-D33A-1340-A2A9-75273506FE76}"/>
-              </a:ext>
-            </a:extLst>
-          </p:cNvPr>
-          <p:cNvSpPr>
-            <a:spLocks noGrp="1"/>
-          </p:cNvSpPr>
-          <p:nvPr>
-            <p:ph idx="1"/>
-          </p:nvPr>
-        </p:nvSpPr>
-        <p:spPr/>
-        <p:txBody>
-          <a:bodyPr/>
-          <a:lstStyle/>
-          <a:p>
-            <a:r>
-              <a:rPr lang="en-US" dirty="0"/>
-              <a:t>Introduction</a:t>
-            </a:r>
-          </a:p>
-          <a:p>
-            <a:r>
-              <a:rPr lang="en-US" dirty="0"/>
-              <a:t>Benefits</a:t>
-            </a:r>
-          </a:p>
-          <a:p>
-            <a:r>
-              <a:rPr lang="en-US" dirty="0"/>
-              <a:t>Library Overview</a:t>
-            </a:r>
-          </a:p>
-          <a:p>
-            <a:r>
-              <a:rPr lang="en-US" dirty="0"/>
-              <a:t>Example Benchmark Workflow</a:t>
-            </a:r>
-          </a:p>
-          <a:p>
-            <a:r>
-              <a:rPr lang="en-US" dirty="0"/>
-              <a:t>Simple Parameter Sweeps</a:t>
-            </a:r>
-          </a:p>
-        </p:txBody>
-      </p:sp>
-    </p:spTree>
-    <p:extLst>
-      <p:ext uri="{BB962C8B-B14F-4D97-AF65-F5344CB8AC3E}">
-        <p14:creationId xmlns:p14="http://schemas.microsoft.com/office/powerpoint/2010/main" val="1014811772"/>
-      </p:ext>
-    </p:extLst>
-  </p:cSld>
-  <p:clrMapOvr>
-    <a:masterClrMapping/>
-  </p:clrMapOvr>
-</p:sld>
-</file>
-
-<file path=ppt/slides/slide3.xml><?xml version="1.0" encoding="utf-8"?>
-<p:sld xmlns:a="http://schemas.openxmlformats.org/drawingml/2006/main" xmlns:r="http://schemas.openxmlformats.org/officeDocument/2006/relationships" xmlns:p="http://schemas.openxmlformats.org/presentationml/2006/main">
-  <p:cSld>
-    <p:spTree>
-      <p:nvGrpSpPr>
-        <p:cNvPr id="1" name=""/>
-        <p:cNvGrpSpPr/>
-        <p:nvPr/>
-      </p:nvGrpSpPr>
-      <p:grpSpPr>
-        <a:xfrm>
-          <a:off x="0" y="0"/>
-          <a:ext cx="0" cy="0"/>
-          <a:chOff x="0" y="0"/>
-          <a:chExt cx="0" cy="0"/>
-        </a:xfrm>
-      </p:grpSpPr>
-      <p:sp>
-        <p:nvSpPr>
           <p:cNvPr id="2" name="Title 1"/>
           <p:cNvSpPr>
             <a:spLocks noGrp="1"/>
@@ -3518,7 +3406,11 @@
           <a:bodyPr/>
           <a:lstStyle/>
           <a:p>
-            <a:endParaRPr lang="en-US"/>
+            <a:r>
+              <a:rPr lang="en-US" dirty="0" smtClean="0"/>
+              <a:t>Installation instructions</a:t>
+            </a:r>
+            <a:endParaRPr lang="en-US" dirty="0"/>
           </a:p>
         </p:txBody>
       </p:sp>
@@ -3540,6 +3432,29 @@
             <a:endParaRPr lang="en-US" dirty="0" smtClean="0"/>
           </a:p>
           <a:p>
+            <a:pPr marL="0" indent="0">
+              <a:buNone/>
+            </a:pPr>
+            <a:r>
+              <a:rPr lang="en-US" dirty="0" smtClean="0"/>
+              <a:t>Before the tutorial, install the </a:t>
+            </a:r>
+            <a:r>
+              <a:rPr lang="en-US" dirty="0" err="1" smtClean="0"/>
+              <a:t>conda</a:t>
+            </a:r>
+            <a:r>
+              <a:rPr lang="en-US" dirty="0" smtClean="0"/>
+              <a:t> and </a:t>
+            </a:r>
+            <a:r>
+              <a:rPr lang="en-US" dirty="0" err="1" smtClean="0"/>
+              <a:t>spack</a:t>
+            </a:r>
+            <a:r>
+              <a:rPr lang="en-US" dirty="0" smtClean="0"/>
+              <a:t> components described here:</a:t>
+            </a:r>
             <a:endParaRPr lang="en-US" dirty="0"/>
           </a:p>
           <a:p>
@@ -3570,75 +3485,7 @@
 </p:sld>
 </file>
 
-<file path=ppt/slides/slide4.xml><?xml version="1.0" encoding="utf-8"?>
-<p:sld xmlns:a="http://schemas.openxmlformats.org/drawingml/2006/main" xmlns:r="http://schemas.openxmlformats.org/officeDocument/2006/relationships" xmlns:p="http://schemas.openxmlformats.org/presentationml/2006/main">
-  <p:cSld>
-    <p:spTree>
-      <p:nvGrpSpPr>
-        <p:cNvPr id="1" name=""/>
-        <p:cNvGrpSpPr/>
-        <p:nvPr/>
-      </p:nvGrpSpPr>
-      <p:grpSpPr>
-        <a:xfrm>
-          <a:off x="0" y="0"/>
-          <a:ext cx="0" cy="0"/>
-          <a:chOff x="0" y="0"/>
-          <a:chExt cx="0" cy="0"/>
-        </a:xfrm>
-      </p:grpSpPr>
-      <p:sp>
-        <p:nvSpPr>
-          <p:cNvPr id="2" name="Title 1"/>
-          <p:cNvSpPr>
-            <a:spLocks noGrp="1"/>
-          </p:cNvSpPr>
-          <p:nvPr>
-            <p:ph type="title"/>
-          </p:nvPr>
-        </p:nvSpPr>
-        <p:spPr/>
-        <p:txBody>
-          <a:bodyPr/>
-          <a:lstStyle/>
-          <a:p>
-            <a:endParaRPr lang="en-US"/>
-          </a:p>
-        </p:txBody>
-      </p:sp>
-      <p:sp>
-        <p:nvSpPr>
-          <p:cNvPr id="3" name="Content Placeholder 2"/>
-          <p:cNvSpPr>
-            <a:spLocks noGrp="1"/>
-          </p:cNvSpPr>
-          <p:nvPr>
-            <p:ph idx="1"/>
-          </p:nvPr>
-        </p:nvSpPr>
-        <p:spPr/>
-        <p:txBody>
-          <a:bodyPr/>
-          <a:lstStyle/>
-          <a:p>
-            <a:endParaRPr lang="en-US"/>
-          </a:p>
-        </p:txBody>
-      </p:sp>
-    </p:spTree>
-    <p:extLst>
-      <p:ext uri="{BB962C8B-B14F-4D97-AF65-F5344CB8AC3E}">
-        <p14:creationId xmlns:p14="http://schemas.microsoft.com/office/powerpoint/2010/main" val="1667233598"/>
-      </p:ext>
-    </p:extLst>
-  </p:cSld>
-  <p:clrMapOvr>
-    <a:masterClrMapping/>
-  </p:clrMapOvr>
-</p:sld>
-</file>
-
-<file path=ppt/slides/slide5.xml><?xml version="1.0" encoding="utf-8"?>
+<file path=ppt/slides/slide3.xml><?xml version="1.0" encoding="utf-8"?>
 <p:sld xmlns:a="http://schemas.openxmlformats.org/drawingml/2006/main" xmlns:r="http://schemas.openxmlformats.org/officeDocument/2006/relationships" xmlns:p="http://schemas.openxmlformats.org/presentationml/2006/main">
   <p:cSld>
     <p:spTree>
@@ -4799,11 +4646,11 @@
 <file path=customXml/itemProps2.xml><?xml version="1.0" encoding="utf-8"?>
 <ds:datastoreItem xmlns:ds="http://schemas.openxmlformats.org/officeDocument/2006/customXml" ds:itemID="{A50EC660-24D0-43A0-AE5E-E274115E726B}">
   <ds:schemaRefs>
+    <ds:schemaRef ds:uri="http://schemas.microsoft.com/office/2006/documentManagement/types"/>
     <ds:schemaRef ds:uri="http://purl.org/dc/elements/1.1/"/>
     <ds:schemaRef ds:uri="http://schemas.microsoft.com/office/2006/metadata/properties"/>
     <ds:schemaRef ds:uri="http://purl.org/dc/terms/"/>
     <ds:schemaRef ds:uri="http://schemas.openxmlformats.org/package/2006/metadata/core-properties"/>
-    <ds:schemaRef ds:uri="http://schemas.microsoft.com/office/2006/documentManagement/types"/>
     <ds:schemaRef ds:uri="http://www.w3.org/XML/1998/namespace"/>
     <ds:schemaRef ds:uri="http://purl.org/dc/dcmitype/"/>
   </ds:schemaRefs>

</xml_diff>

<commit_message>
Exported PDF from here
</commit_message>
<xml_diff>
--- a/2020/ECP/slides/02-install.pptx
+++ b/2020/ECP/slides/02-install.pptx
@@ -144,7 +144,7 @@
   </p:defaultTextStyle>
   <p:extLst>
     <p:ext uri="{EFAFB233-063F-42B5-8137-9DF3F51BA10A}">
-      <p15:sldGuideLst xmlns:p15="http://schemas.microsoft.com/office/powerpoint/2012/main" xmlns="">
+      <p15:sldGuideLst xmlns="" xmlns:p15="http://schemas.microsoft.com/office/powerpoint/2012/main">
         <p15:guide id="2" pos="282">
           <p15:clr>
             <a:srgbClr val="A4A3A4"/>
@@ -158,7 +158,7 @@
       </p15:sldGuideLst>
     </p:ext>
     <p:ext uri="{2D200454-40CA-4A62-9FC3-DE9A4176ACB9}">
-      <p15:notesGuideLst xmlns:p15="http://schemas.microsoft.com/office/powerpoint/2012/main" xmlns="">
+      <p15:notesGuideLst xmlns="" xmlns:p15="http://schemas.microsoft.com/office/powerpoint/2012/main">
         <p15:guide id="1" orient="horz" pos="2928">
           <p15:clr>
             <a:srgbClr val="A4A3A4"/>
@@ -263,7 +263,7 @@
           <a:p>
             <a:fld id="{0B842F42-2CE9-4E35-95C1-410DC08A50B1}" type="datetimeFigureOut">
               <a:rPr lang="en-US" smtClean="0"/>
-              <a:t>2/2/2020</a:t>
+              <a:t>2/3/2020</a:t>
             </a:fld>
             <a:endParaRPr lang="en-US"/>
           </a:p>
@@ -428,7 +428,7 @@
           <a:p>
             <a:fld id="{6F282904-F315-4730-8D91-37D99E141A6F}" type="datetimeFigureOut">
               <a:rPr lang="en-US" smtClean="0"/>
-              <a:t>2/2/2020</a:t>
+              <a:t>2/3/2020</a:t>
             </a:fld>
             <a:endParaRPr lang="en-US"/>
           </a:p>
@@ -3453,7 +3453,11 @@
             </a:r>
             <a:r>
               <a:rPr lang="en-US" dirty="0" smtClean="0"/>
-              <a:t> components described here:</a:t>
+              <a:t> components described </a:t>
+            </a:r>
+            <a:r>
+              <a:rPr lang="en-US" dirty="0" smtClean="0"/>
+              <a:t>here, and run the stand-alone test.</a:t>
             </a:r>
             <a:endParaRPr lang="en-US" dirty="0"/>
           </a:p>
@@ -3467,8 +3471,25 @@
             </a:r>
             <a:r>
               <a:rPr lang="en-US" dirty="0"/>
-              <a:t>://github.com/ECP-CANDLE/Tutorials/tree/master/2020/ECP</a:t>
-            </a:r>
+              <a:t>://</a:t>
+            </a:r>
+            <a:r>
+              <a:rPr lang="en-US" dirty="0" smtClean="0"/>
+              <a:t>github.com/ECP-CANDLE/Tutorials/tree/master/2020/ECP</a:t>
+            </a:r>
+          </a:p>
+          <a:p>
+            <a:endParaRPr lang="en-US" dirty="0"/>
+          </a:p>
+          <a:p>
+            <a:pPr marL="0" indent="0">
+              <a:buNone/>
+            </a:pPr>
+            <a:r>
+              <a:rPr lang="en-US" dirty="0" smtClean="0"/>
+              <a:t>During the sessions, if on the hotel network, consider running the tutorial on a remote workstation to limit network congestion</a:t>
+            </a:r>
+            <a:endParaRPr lang="en-US" dirty="0"/>
           </a:p>
         </p:txBody>
       </p:sp>
@@ -3988,7 +4009,7 @@
   <a:extraClrSchemeLst/>
   <a:extLst>
     <a:ext uri="{05A4C25C-085E-4340-85A3-A5531E510DB2}">
-      <thm15:themeFamily xmlns:thm15="http://schemas.microsoft.com/office/thememl/2012/main" xmlns="" name="CANDLELib_ECP_2019" id="{8C0C58F9-E13D-C749-9CD8-D6ACD55E54AE}" vid="{C7F1EDA4-5412-C244-BA03-3C19A48BF1ED}"/>
+      <thm15:themeFamily xmlns="" xmlns:thm15="http://schemas.microsoft.com/office/thememl/2012/main" name="CANDLELib_ECP_2019" id="{8C0C58F9-E13D-C749-9CD8-D6ACD55E54AE}" vid="{C7F1EDA4-5412-C244-BA03-3C19A48BF1ED}"/>
     </a:ext>
   </a:extLst>
 </a:theme>
@@ -4565,6 +4586,21 @@
 </file>
 
 <file path=customXml/item1.xml><?xml version="1.0" encoding="utf-8"?>
+<?mso-contentType ?>
+<FormTemplates xmlns="http://schemas.microsoft.com/sharepoint/v3/contenttype/forms">
+  <Display>DocumentLibraryForm</Display>
+  <Edit>DocumentLibraryForm</Edit>
+  <New>DocumentLibraryForm</New>
+</FormTemplates>
+</file>
+
+<file path=customXml/item2.xml><?xml version="1.0" encoding="utf-8"?>
+<p:properties xmlns:p="http://schemas.microsoft.com/office/2006/metadata/properties" xmlns:xsi="http://www.w3.org/2001/XMLSchema-instance" xmlns:pc="http://schemas.microsoft.com/office/infopath/2007/PartnerControls">
+  <documentManagement/>
+</p:properties>
+</file>
+
+<file path=customXml/item3.xml><?xml version="1.0" encoding="utf-8"?>
 <ct:contentTypeSchema xmlns:ct="http://schemas.microsoft.com/office/2006/metadata/contentType" xmlns:ma="http://schemas.microsoft.com/office/2006/metadata/properties/metaAttributes" ct:_="" ma:_="" ma:contentTypeName="Document" ma:contentTypeID="0x010100693156C96291C349BBF8B640319D465D" ma:contentTypeVersion="0" ma:contentTypeDescription="Create a new document." ma:contentTypeScope="" ma:versionID="8a71be8d30b42e8e74cf70a4a4cbda4c">
   <xsd:schema xmlns:xsd="http://www.w3.org/2001/XMLSchema" xmlns:p="http://schemas.microsoft.com/office/2006/metadata/properties" targetNamespace="http://schemas.microsoft.com/office/2006/metadata/properties" ma:root="true" ma:fieldsID="4aeb20c0e3442673af7ee10786458764">
     <xsd:element name="properties">
@@ -4613,32 +4649,10 @@
 </ct:contentTypeSchema>
 </file>
 
-<file path=customXml/item2.xml><?xml version="1.0" encoding="utf-8"?>
-<p:properties xmlns:p="http://schemas.microsoft.com/office/2006/metadata/properties" xmlns:xsi="http://www.w3.org/2001/XMLSchema-instance" xmlns:pc="http://schemas.microsoft.com/office/infopath/2007/PartnerControls">
-  <documentManagement/>
-</p:properties>
-</file>
-
-<file path=customXml/item3.xml><?xml version="1.0" encoding="utf-8"?>
-<?mso-contentType ?>
-<FormTemplates xmlns="http://schemas.microsoft.com/sharepoint/v3/contenttype/forms">
-  <Display>DocumentLibraryForm</Display>
-  <Edit>DocumentLibraryForm</Edit>
-  <New>DocumentLibraryForm</New>
-</FormTemplates>
-</file>
-
 <file path=customXml/itemProps1.xml><?xml version="1.0" encoding="utf-8"?>
-<ds:datastoreItem xmlns:ds="http://schemas.openxmlformats.org/officeDocument/2006/customXml" ds:itemID="{D85F602D-FF92-4BDD-B4C2-093468CCF754}">
+<ds:datastoreItem xmlns:ds="http://schemas.openxmlformats.org/officeDocument/2006/customXml" ds:itemID="{19E20559-B232-4371-8690-E3D8007EDB82}">
   <ds:schemaRefs>
-    <ds:schemaRef ds:uri="http://schemas.microsoft.com/office/2006/metadata/contentType"/>
-    <ds:schemaRef ds:uri="http://schemas.microsoft.com/office/2006/metadata/properties/metaAttributes"/>
-    <ds:schemaRef ds:uri="http://www.w3.org/2001/XMLSchema"/>
-    <ds:schemaRef ds:uri="http://schemas.microsoft.com/office/2006/metadata/properties"/>
-    <ds:schemaRef ds:uri="http://schemas.openxmlformats.org/package/2006/metadata/core-properties"/>
-    <ds:schemaRef ds:uri="http://purl.org/dc/elements/1.1/"/>
-    <ds:schemaRef ds:uri="http://purl.org/dc/terms/"/>
-    <ds:schemaRef ds:uri="http://schemas.microsoft.com/office/internal/2005/internalDocumentation"/>
+    <ds:schemaRef ds:uri="http://schemas.microsoft.com/sharepoint/v3/contenttype/forms"/>
   </ds:schemaRefs>
 </ds:datastoreItem>
 </file>
@@ -4653,14 +4667,22 @@
     <ds:schemaRef ds:uri="http://schemas.openxmlformats.org/package/2006/metadata/core-properties"/>
     <ds:schemaRef ds:uri="http://www.w3.org/XML/1998/namespace"/>
     <ds:schemaRef ds:uri="http://purl.org/dc/dcmitype/"/>
+    <ds:schemaRef ds:uri="http://schemas.microsoft.com/office/infopath/2007/PartnerControls"/>
   </ds:schemaRefs>
 </ds:datastoreItem>
 </file>
 
 <file path=customXml/itemProps3.xml><?xml version="1.0" encoding="utf-8"?>
-<ds:datastoreItem xmlns:ds="http://schemas.openxmlformats.org/officeDocument/2006/customXml" ds:itemID="{19E20559-B232-4371-8690-E3D8007EDB82}">
+<ds:datastoreItem xmlns:ds="http://schemas.openxmlformats.org/officeDocument/2006/customXml" ds:itemID="{D85F602D-FF92-4BDD-B4C2-093468CCF754}">
   <ds:schemaRefs>
-    <ds:schemaRef ds:uri="http://schemas.microsoft.com/sharepoint/v3/contenttype/forms"/>
+    <ds:schemaRef ds:uri="http://schemas.microsoft.com/office/2006/metadata/contentType"/>
+    <ds:schemaRef ds:uri="http://schemas.microsoft.com/office/2006/metadata/properties/metaAttributes"/>
+    <ds:schemaRef ds:uri="http://www.w3.org/2001/XMLSchema"/>
+    <ds:schemaRef ds:uri="http://schemas.microsoft.com/office/2006/metadata/properties"/>
+    <ds:schemaRef ds:uri="http://schemas.openxmlformats.org/package/2006/metadata/core-properties"/>
+    <ds:schemaRef ds:uri="http://purl.org/dc/elements/1.1/"/>
+    <ds:schemaRef ds:uri="http://purl.org/dc/terms/"/>
+    <ds:schemaRef ds:uri="http://schemas.microsoft.com/office/internal/2005/internalDocumentation"/>
   </ds:schemaRefs>
 </ds:datastoreItem>
 </file>
</xml_diff>